<commit_message>
refactor: minor report modification
</commit_message>
<xml_diff>
--- a/report/Naufal_Aldy_Pradana_VIX_Final_Project.pptx
+++ b/report/Naufal_Aldy_Pradana_VIX_Final_Project.pptx
@@ -4728,6 +4728,66 @@
           </a:p>
         </p:txBody>
       </p:sp>
+      <p:pic>
+        <p:nvPicPr>
+          <p:cNvPr id="6" name="Picture 5">
+            <a:extLst>
+              <a:ext uri="{FF2B5EF4-FFF2-40B4-BE49-F238E27FC236}">
+                <a16:creationId xmlns:a16="http://schemas.microsoft.com/office/drawing/2014/main" id="{11F54078-ECCC-BCFF-FCB0-746A5E99365C}"/>
+              </a:ext>
+            </a:extLst>
+          </p:cNvPr>
+          <p:cNvPicPr>
+            <a:picLocks noChangeAspect="1"/>
+          </p:cNvPicPr>
+          <p:nvPr/>
+        </p:nvPicPr>
+        <p:blipFill>
+          <a:blip r:embed="rId5"/>
+          <a:stretch>
+            <a:fillRect/>
+          </a:stretch>
+        </p:blipFill>
+        <p:spPr>
+          <a:xfrm>
+            <a:off x="1028700" y="3342858"/>
+            <a:ext cx="5235466" cy="4448972"/>
+          </a:xfrm>
+          <a:prstGeom prst="rect">
+            <a:avLst/>
+          </a:prstGeom>
+        </p:spPr>
+      </p:pic>
+      <p:pic>
+        <p:nvPicPr>
+          <p:cNvPr id="8" name="Picture 7">
+            <a:extLst>
+              <a:ext uri="{FF2B5EF4-FFF2-40B4-BE49-F238E27FC236}">
+                <a16:creationId xmlns:a16="http://schemas.microsoft.com/office/drawing/2014/main" id="{84069079-3DB5-38E0-E710-124F2508C7A3}"/>
+              </a:ext>
+            </a:extLst>
+          </p:cNvPr>
+          <p:cNvPicPr>
+            <a:picLocks noChangeAspect="1"/>
+          </p:cNvPicPr>
+          <p:nvPr/>
+        </p:nvPicPr>
+        <p:blipFill>
+          <a:blip r:embed="rId6"/>
+          <a:stretch>
+            <a:fillRect/>
+          </a:stretch>
+        </p:blipFill>
+        <p:spPr>
+          <a:xfrm>
+            <a:off x="6735691" y="3342858"/>
+            <a:ext cx="5140999" cy="4490988"/>
+          </a:xfrm>
+          <a:prstGeom prst="rect">
+            <a:avLst/>
+          </a:prstGeom>
+        </p:spPr>
+      </p:pic>
     </p:spTree>
   </p:cSld>
   <p:clrMapOvr>

</xml_diff>